<commit_message>
Update design and function promotion form
</commit_message>
<xml_diff>
--- a/Отчёт/Создание ИС для автоматизации работы СТО.pptx
+++ b/Отчёт/Создание ИС для автоматизации работы СТО.pptx
@@ -5,17 +5,18 @@
     <p:sldMasterId id="2147483648" r:id="rId1"/>
   </p:sldMasterIdLst>
   <p:notesMasterIdLst>
-    <p:notesMasterId r:id="rId10"/>
+    <p:notesMasterId r:id="rId11"/>
   </p:notesMasterIdLst>
   <p:sldIdLst>
     <p:sldId id="256" r:id="rId2"/>
     <p:sldId id="258" r:id="rId3"/>
     <p:sldId id="259" r:id="rId4"/>
-    <p:sldId id="294" r:id="rId5"/>
-    <p:sldId id="295" r:id="rId6"/>
-    <p:sldId id="296" r:id="rId7"/>
-    <p:sldId id="286" r:id="rId8"/>
-    <p:sldId id="292" r:id="rId9"/>
+    <p:sldId id="295" r:id="rId5"/>
+    <p:sldId id="294" r:id="rId6"/>
+    <p:sldId id="297" r:id="rId7"/>
+    <p:sldId id="296" r:id="rId8"/>
+    <p:sldId id="286" r:id="rId9"/>
+    <p:sldId id="292" r:id="rId10"/>
   </p:sldIdLst>
   <p:sldSz cx="12192000" cy="6858000"/>
   <p:notesSz cx="6858000" cy="9144000"/>
@@ -122,6 +123,32 @@
 </p:presentation>
 </file>
 
+<file path=ppt/commentAuthors.xml><?xml version="1.0" encoding="utf-8"?>
+<p:cmAuthorLst xmlns:a="http://schemas.openxmlformats.org/drawingml/2006/main" xmlns:r="http://schemas.openxmlformats.org/officeDocument/2006/relationships" xmlns:p="http://schemas.openxmlformats.org/presentationml/2006/main">
+  <p:cmAuthor id="1" name="Ilya Revkin" initials="IR" lastIdx="2" clrIdx="0">
+    <p:extLst>
+      <p:ext uri="{19B8F6BF-5375-455C-9EA6-DF929625EA0E}">
+        <p15:presenceInfo xmlns:p15="http://schemas.microsoft.com/office/powerpoint/2012/main" userId="2c894bd8b77a5799" providerId="Windows Live"/>
+      </p:ext>
+    </p:extLst>
+  </p:cmAuthor>
+</p:cmAuthorLst>
+</file>
+
+<file path=ppt/comments/comment1.xml><?xml version="1.0" encoding="utf-8"?>
+<p:cmLst xmlns:a="http://schemas.openxmlformats.org/drawingml/2006/main" xmlns:r="http://schemas.openxmlformats.org/officeDocument/2006/relationships" xmlns:p="http://schemas.openxmlformats.org/presentationml/2006/main">
+  <p:cm authorId="1" dt="2022-06-07T20:06:57.873" idx="2">
+    <p:pos x="1672" y="3413"/>
+    <p:text>Нагруженость излишним функционалом</p:text>
+    <p:extLst>
+      <p:ext uri="{C676402C-5697-4E1C-873F-D02D1690AC5C}">
+        <p15:threadingInfo xmlns:p15="http://schemas.microsoft.com/office/powerpoint/2012/main" timeZoneBias="-180"/>
+      </p:ext>
+    </p:extLst>
+  </p:cm>
+</p:cmLst>
+</file>
+
 <file path=ppt/notesMasters/notesMaster1.xml><?xml version="1.0" encoding="utf-8"?>
 <p:notesMaster xmlns:a="http://schemas.openxmlformats.org/drawingml/2006/main" xmlns:r="http://schemas.openxmlformats.org/officeDocument/2006/relationships" xmlns:p="http://schemas.openxmlformats.org/presentationml/2006/main">
   <p:cSld>
@@ -204,7 +231,7 @@
           <a:p>
             <a:fld id="{CA55144A-5573-4C41-BDEC-B0EEDB3C9D99}" type="datetimeFigureOut">
               <a:rPr lang="ru-RU" smtClean="0"/>
-              <a:t>03.06.22</a:t>
+              <a:t>06.06.22</a:t>
             </a:fld>
             <a:endParaRPr lang="ru-RU"/>
           </a:p>
@@ -850,7 +877,7 @@
     </p:spTree>
     <p:extLst>
       <p:ext uri="{BB962C8B-B14F-4D97-AF65-F5344CB8AC3E}">
-        <p14:creationId xmlns:p14="http://schemas.microsoft.com/office/powerpoint/2010/main" val="2905938903"/>
+        <p14:creationId xmlns:p14="http://schemas.microsoft.com/office/powerpoint/2010/main" val="608946682"/>
       </p:ext>
     </p:extLst>
   </p:cSld>
@@ -962,7 +989,7 @@
     </p:spTree>
     <p:extLst>
       <p:ext uri="{BB962C8B-B14F-4D97-AF65-F5344CB8AC3E}">
-        <p14:creationId xmlns:p14="http://schemas.microsoft.com/office/powerpoint/2010/main" val="608946682"/>
+        <p14:creationId xmlns:p14="http://schemas.microsoft.com/office/powerpoint/2010/main" val="2905938903"/>
       </p:ext>
     </p:extLst>
   </p:cSld>
@@ -1016,6 +1043,118 @@
           <a:bodyPr/>
           <a:lstStyle/>
           <a:p>
+            <a:pPr marL="0" marR="0" indent="0" algn="l" defTabSz="914400" rtl="0" eaLnBrk="1" fontAlgn="auto" latinLnBrk="0" hangingPunct="1">
+              <a:lnSpc>
+                <a:spcPct val="100000"/>
+              </a:lnSpc>
+              <a:spcBef>
+                <a:spcPts val="0"/>
+              </a:spcBef>
+              <a:spcAft>
+                <a:spcPts val="0"/>
+              </a:spcAft>
+              <a:buClrTx/>
+              <a:buSzTx/>
+              <a:buFontTx/>
+              <a:buNone/>
+              <a:tabLst/>
+              <a:defRPr/>
+            </a:pPr>
+            <a:r>
+              <a:rPr lang="ru-RU" dirty="0" smtClean="0"/>
+              <a:t>На</a:t>
+            </a:r>
+            <a:r>
+              <a:rPr lang="ru-RU" baseline="0" dirty="0" smtClean="0"/>
+              <a:t> слайде могут быть  тезисы, определения, схемы, диаграммы , картинки.  Не надо копировать абзацы текста из диплома.</a:t>
+            </a:r>
+            <a:endParaRPr lang="ru-RU" dirty="0" smtClean="0"/>
+          </a:p>
+          <a:p>
+            <a:endParaRPr lang="ru-RU" dirty="0"/>
+          </a:p>
+        </p:txBody>
+      </p:sp>
+      <p:sp>
+        <p:nvSpPr>
+          <p:cNvPr id="4" name="Номер слайда 3"/>
+          <p:cNvSpPr>
+            <a:spLocks noGrp="1"/>
+          </p:cNvSpPr>
+          <p:nvPr>
+            <p:ph type="sldNum" sz="quarter" idx="10"/>
+          </p:nvPr>
+        </p:nvSpPr>
+        <p:spPr/>
+        <p:txBody>
+          <a:bodyPr/>
+          <a:lstStyle/>
+          <a:p>
+            <a:fld id="{6C9276A5-7EBE-43AB-BAE6-529A0B3BF8B0}" type="slidenum">
+              <a:rPr lang="ru-RU" smtClean="0"/>
+              <a:t>6</a:t>
+            </a:fld>
+            <a:endParaRPr lang="ru-RU"/>
+          </a:p>
+        </p:txBody>
+      </p:sp>
+    </p:spTree>
+    <p:extLst>
+      <p:ext uri="{BB962C8B-B14F-4D97-AF65-F5344CB8AC3E}">
+        <p14:creationId xmlns:p14="http://schemas.microsoft.com/office/powerpoint/2010/main" val="3814662937"/>
+      </p:ext>
+    </p:extLst>
+  </p:cSld>
+  <p:clrMapOvr>
+    <a:masterClrMapping/>
+  </p:clrMapOvr>
+</p:notes>
+</file>
+
+<file path=ppt/notesSlides/notesSlide7.xml><?xml version="1.0" encoding="utf-8"?>
+<p:notes xmlns:a="http://schemas.openxmlformats.org/drawingml/2006/main" xmlns:r="http://schemas.openxmlformats.org/officeDocument/2006/relationships" xmlns:p="http://schemas.openxmlformats.org/presentationml/2006/main">
+  <p:cSld>
+    <p:spTree>
+      <p:nvGrpSpPr>
+        <p:cNvPr id="1" name=""/>
+        <p:cNvGrpSpPr/>
+        <p:nvPr/>
+      </p:nvGrpSpPr>
+      <p:grpSpPr>
+        <a:xfrm>
+          <a:off x="0" y="0"/>
+          <a:ext cx="0" cy="0"/>
+          <a:chOff x="0" y="0"/>
+          <a:chExt cx="0" cy="0"/>
+        </a:xfrm>
+      </p:grpSpPr>
+      <p:sp>
+        <p:nvSpPr>
+          <p:cNvPr id="2" name="Образ слайда 1"/>
+          <p:cNvSpPr>
+            <a:spLocks noGrp="1" noRot="1" noChangeAspect="1"/>
+          </p:cNvSpPr>
+          <p:nvPr>
+            <p:ph type="sldImg"/>
+          </p:nvPr>
+        </p:nvSpPr>
+        <p:spPr/>
+      </p:sp>
+      <p:sp>
+        <p:nvSpPr>
+          <p:cNvPr id="3" name="Заметки 2"/>
+          <p:cNvSpPr>
+            <a:spLocks noGrp="1"/>
+          </p:cNvSpPr>
+          <p:nvPr>
+            <p:ph type="body" idx="1"/>
+          </p:nvPr>
+        </p:nvSpPr>
+        <p:spPr/>
+        <p:txBody>
+          <a:bodyPr/>
+          <a:lstStyle/>
+          <a:p>
             <a:r>
               <a:rPr lang="ru-RU" dirty="0" smtClean="0"/>
               <a:t>Подвести итог проделанной работе. Можно </a:t>
@@ -1053,7 +1192,7 @@
           <a:p>
             <a:fld id="{6C9276A5-7EBE-43AB-BAE6-529A0B3BF8B0}" type="slidenum">
               <a:rPr lang="ru-RU" smtClean="0"/>
-              <a:t>7</a:t>
+              <a:t>8</a:t>
             </a:fld>
             <a:endParaRPr lang="ru-RU"/>
           </a:p>
@@ -1203,7 +1342,7 @@
           <a:p>
             <a:fld id="{06C2D330-F70F-4CA8-92A7-43FE8FB8CB21}" type="datetimeFigureOut">
               <a:rPr lang="ru-RU" smtClean="0"/>
-              <a:t>03.06.22</a:t>
+              <a:t>06.06.22</a:t>
             </a:fld>
             <a:endParaRPr lang="ru-RU"/>
           </a:p>
@@ -1373,7 +1512,7 @@
           <a:p>
             <a:fld id="{06C2D330-F70F-4CA8-92A7-43FE8FB8CB21}" type="datetimeFigureOut">
               <a:rPr lang="ru-RU" smtClean="0"/>
-              <a:t>03.06.22</a:t>
+              <a:t>06.06.22</a:t>
             </a:fld>
             <a:endParaRPr lang="ru-RU"/>
           </a:p>
@@ -1553,7 +1692,7 @@
           <a:p>
             <a:fld id="{06C2D330-F70F-4CA8-92A7-43FE8FB8CB21}" type="datetimeFigureOut">
               <a:rPr lang="ru-RU" smtClean="0"/>
-              <a:t>03.06.22</a:t>
+              <a:t>06.06.22</a:t>
             </a:fld>
             <a:endParaRPr lang="ru-RU"/>
           </a:p>
@@ -1723,7 +1862,7 @@
           <a:p>
             <a:fld id="{06C2D330-F70F-4CA8-92A7-43FE8FB8CB21}" type="datetimeFigureOut">
               <a:rPr lang="ru-RU" smtClean="0"/>
-              <a:t>03.06.22</a:t>
+              <a:t>06.06.22</a:t>
             </a:fld>
             <a:endParaRPr lang="ru-RU"/>
           </a:p>
@@ -1969,7 +2108,7 @@
           <a:p>
             <a:fld id="{06C2D330-F70F-4CA8-92A7-43FE8FB8CB21}" type="datetimeFigureOut">
               <a:rPr lang="ru-RU" smtClean="0"/>
-              <a:t>03.06.22</a:t>
+              <a:t>06.06.22</a:t>
             </a:fld>
             <a:endParaRPr lang="ru-RU"/>
           </a:p>
@@ -2201,7 +2340,7 @@
           <a:p>
             <a:fld id="{06C2D330-F70F-4CA8-92A7-43FE8FB8CB21}" type="datetimeFigureOut">
               <a:rPr lang="ru-RU" smtClean="0"/>
-              <a:t>03.06.22</a:t>
+              <a:t>06.06.22</a:t>
             </a:fld>
             <a:endParaRPr lang="ru-RU"/>
           </a:p>
@@ -2568,7 +2707,7 @@
           <a:p>
             <a:fld id="{06C2D330-F70F-4CA8-92A7-43FE8FB8CB21}" type="datetimeFigureOut">
               <a:rPr lang="ru-RU" smtClean="0"/>
-              <a:t>03.06.22</a:t>
+              <a:t>06.06.22</a:t>
             </a:fld>
             <a:endParaRPr lang="ru-RU"/>
           </a:p>
@@ -2686,7 +2825,7 @@
           <a:p>
             <a:fld id="{06C2D330-F70F-4CA8-92A7-43FE8FB8CB21}" type="datetimeFigureOut">
               <a:rPr lang="ru-RU" smtClean="0"/>
-              <a:t>03.06.22</a:t>
+              <a:t>06.06.22</a:t>
             </a:fld>
             <a:endParaRPr lang="ru-RU"/>
           </a:p>
@@ -2781,7 +2920,7 @@
           <a:p>
             <a:fld id="{06C2D330-F70F-4CA8-92A7-43FE8FB8CB21}" type="datetimeFigureOut">
               <a:rPr lang="ru-RU" smtClean="0"/>
-              <a:t>03.06.22</a:t>
+              <a:t>06.06.22</a:t>
             </a:fld>
             <a:endParaRPr lang="ru-RU"/>
           </a:p>
@@ -3058,7 +3197,7 @@
           <a:p>
             <a:fld id="{06C2D330-F70F-4CA8-92A7-43FE8FB8CB21}" type="datetimeFigureOut">
               <a:rPr lang="ru-RU" smtClean="0"/>
-              <a:t>03.06.22</a:t>
+              <a:t>06.06.22</a:t>
             </a:fld>
             <a:endParaRPr lang="ru-RU"/>
           </a:p>
@@ -3311,7 +3450,7 @@
           <a:p>
             <a:fld id="{06C2D330-F70F-4CA8-92A7-43FE8FB8CB21}" type="datetimeFigureOut">
               <a:rPr lang="ru-RU" smtClean="0"/>
-              <a:t>03.06.22</a:t>
+              <a:t>06.06.22</a:t>
             </a:fld>
             <a:endParaRPr lang="ru-RU"/>
           </a:p>
@@ -3524,7 +3663,7 @@
           <a:p>
             <a:fld id="{06C2D330-F70F-4CA8-92A7-43FE8FB8CB21}" type="datetimeFigureOut">
               <a:rPr lang="ru-RU" smtClean="0"/>
-              <a:t>03.06.22</a:t>
+              <a:t>06.06.22</a:t>
             </a:fld>
             <a:endParaRPr lang="ru-RU"/>
           </a:p>
@@ -4040,14 +4179,7 @@
                 <a:latin typeface="Times New Roman" panose="02020603050405020304" pitchFamily="18" charset="0"/>
                 <a:cs typeface="Times New Roman" panose="02020603050405020304" pitchFamily="18" charset="0"/>
               </a:rPr>
-              <a:t>на тему</a:t>
-            </a:r>
-            <a:r>
-              <a:rPr lang="ru-RU" dirty="0" smtClean="0">
-                <a:latin typeface="Times New Roman" panose="02020603050405020304" pitchFamily="18" charset="0"/>
-                <a:cs typeface="Times New Roman" panose="02020603050405020304" pitchFamily="18" charset="0"/>
-              </a:rPr>
-              <a:t>: Разработка автоматизированной системы управления станцией технического обслуживания</a:t>
+              <a:t>на тему: Разработка автоматизированной системы управления станцией технического обслуживания</a:t>
             </a:r>
             <a:endParaRPr lang="ru-RU" dirty="0"/>
           </a:p>
@@ -4351,7 +4483,7 @@
         </p:spPr>
         <p:txBody>
           <a:bodyPr>
-            <a:normAutofit fontScale="92500"/>
+            <a:normAutofit lnSpcReduction="10000"/>
           </a:bodyPr>
           <a:lstStyle/>
           <a:p>
@@ -4379,10 +4511,6 @@
               </a:rPr>
               <a:t>– Создать информационную систему для автоматизации работы и учёта работ станции технического обслуживания</a:t>
             </a:r>
-            <a:endParaRPr lang="ru-RU" dirty="0" smtClean="0">
-              <a:latin typeface="Times New Roman" panose="02020603050405020304" pitchFamily="18" charset="0"/>
-              <a:cs typeface="Times New Roman" panose="02020603050405020304" pitchFamily="18" charset="0"/>
-            </a:endParaRPr>
           </a:p>
           <a:p>
             <a:pPr marL="0" indent="0" algn="ctr">
@@ -4422,10 +4550,15 @@
               </a:rPr>
               <a:t>Изучить структуру работы станции технического обслуживания (далее СТО);</a:t>
             </a:r>
-            <a:endParaRPr lang="ru-RU" dirty="0" smtClean="0">
-              <a:latin typeface="Times New Roman" panose="02020603050405020304" pitchFamily="18" charset="0"/>
-              <a:cs typeface="Times New Roman" panose="02020603050405020304" pitchFamily="18" charset="0"/>
-            </a:endParaRPr>
+          </a:p>
+          <a:p>
+            <a:r>
+              <a:rPr lang="ru-RU" dirty="0">
+                <a:latin typeface="Times New Roman" panose="02020603050405020304" pitchFamily="18" charset="0"/>
+                <a:cs typeface="Times New Roman" panose="02020603050405020304" pitchFamily="18" charset="0"/>
+              </a:rPr>
+              <a:t>Изучить алгоритм внутренней логистики СТО;</a:t>
+            </a:r>
           </a:p>
           <a:p>
             <a:r>
@@ -4433,45 +4566,45 @@
                 <a:latin typeface="Times New Roman" panose="02020603050405020304" pitchFamily="18" charset="0"/>
                 <a:cs typeface="Times New Roman" panose="02020603050405020304" pitchFamily="18" charset="0"/>
               </a:rPr>
-              <a:t>Проанализировать существующие системы автоматизации работ СТО</a:t>
+              <a:t>Проанализировать </a:t>
             </a:r>
             <a:r>
               <a:rPr lang="ru-RU" dirty="0" smtClean="0">
                 <a:latin typeface="Times New Roman" panose="02020603050405020304" pitchFamily="18" charset="0"/>
                 <a:cs typeface="Times New Roman" panose="02020603050405020304" pitchFamily="18" charset="0"/>
               </a:rPr>
-              <a:t>;</a:t>
-            </a:r>
-            <a:endParaRPr lang="ru-RU" dirty="0" smtClean="0">
-              <a:latin typeface="Times New Roman" panose="02020603050405020304" pitchFamily="18" charset="0"/>
-              <a:cs typeface="Times New Roman" panose="02020603050405020304" pitchFamily="18" charset="0"/>
-            </a:endParaRPr>
-          </a:p>
-          <a:p>
+              <a:t>существующие системы </a:t>
+            </a:r>
             <a:r>
               <a:rPr lang="ru-RU" dirty="0" smtClean="0">
                 <a:latin typeface="Times New Roman" panose="02020603050405020304" pitchFamily="18" charset="0"/>
                 <a:cs typeface="Times New Roman" panose="02020603050405020304" pitchFamily="18" charset="0"/>
               </a:rPr>
-              <a:t>Изучить алгоритм внутренней логистики СТО;</a:t>
-            </a:r>
-            <a:endParaRPr lang="ru-RU" dirty="0" smtClean="0">
-              <a:latin typeface="Times New Roman" panose="02020603050405020304" pitchFamily="18" charset="0"/>
-              <a:cs typeface="Times New Roman" panose="02020603050405020304" pitchFamily="18" charset="0"/>
-            </a:endParaRPr>
-          </a:p>
-          <a:p>
+              <a:t>контроля </a:t>
+            </a:r>
             <a:r>
               <a:rPr lang="ru-RU" dirty="0" smtClean="0">
                 <a:latin typeface="Times New Roman" panose="02020603050405020304" pitchFamily="18" charset="0"/>
                 <a:cs typeface="Times New Roman" panose="02020603050405020304" pitchFamily="18" charset="0"/>
               </a:rPr>
-              <a:t>Разработать готовую информационную систему (далее ИС) работы СТО.</a:t>
-            </a:r>
-            <a:endParaRPr lang="ru-RU" dirty="0" smtClean="0">
-              <a:latin typeface="Times New Roman" panose="02020603050405020304" pitchFamily="18" charset="0"/>
-              <a:cs typeface="Times New Roman" panose="02020603050405020304" pitchFamily="18" charset="0"/>
-            </a:endParaRPr>
+              <a:t>работ СТО;</a:t>
+            </a:r>
+          </a:p>
+          <a:p>
+            <a:r>
+              <a:rPr lang="ru-RU" dirty="0" smtClean="0">
+                <a:latin typeface="Times New Roman" panose="02020603050405020304" pitchFamily="18" charset="0"/>
+                <a:cs typeface="Times New Roman" panose="02020603050405020304" pitchFamily="18" charset="0"/>
+              </a:rPr>
+              <a:t>Разработать </a:t>
+            </a:r>
+            <a:r>
+              <a:rPr lang="ru-RU" dirty="0" smtClean="0">
+                <a:latin typeface="Times New Roman" panose="02020603050405020304" pitchFamily="18" charset="0"/>
+                <a:cs typeface="Times New Roman" panose="02020603050405020304" pitchFamily="18" charset="0"/>
+              </a:rPr>
+              <a:t>готовую информационную систему (далее ИС) работы СТО.</a:t>
+            </a:r>
           </a:p>
           <a:p>
             <a:endParaRPr lang="ru-RU" dirty="0" smtClean="0">
@@ -4598,7 +4731,7 @@
         </p:spPr>
         <p:txBody>
           <a:bodyPr>
-            <a:normAutofit/>
+            <a:normAutofit fontScale="92500" lnSpcReduction="10000"/>
           </a:bodyPr>
           <a:lstStyle/>
           <a:p>
@@ -4610,21 +4743,79 @@
                 <a:latin typeface="Times New Roman" panose="02020603050405020304" pitchFamily="18" charset="0"/>
                 <a:cs typeface="Times New Roman" panose="02020603050405020304" pitchFamily="18" charset="0"/>
               </a:rPr>
-              <a:t>Описание решения в соответствии с ВКР</a:t>
-            </a:r>
-          </a:p>
-          <a:p>
-            <a:pPr marL="0" indent="0">
-              <a:buNone/>
-            </a:pPr>
+              <a:t>Структура работы СТО состоит из нескольких отделов:</a:t>
+            </a:r>
+          </a:p>
+          <a:p>
             <a:r>
               <a:rPr lang="ru-RU" dirty="0" smtClean="0">
                 <a:latin typeface="Times New Roman" panose="02020603050405020304" pitchFamily="18" charset="0"/>
                 <a:cs typeface="Times New Roman" panose="02020603050405020304" pitchFamily="18" charset="0"/>
               </a:rPr>
-              <a:t>(на каждую задачу может быть несколько слайдов)</a:t>
-            </a:r>
+              <a:t>Руководство;</a:t>
+            </a:r>
+          </a:p>
+          <a:p>
+            <a:r>
+              <a:rPr lang="ru-RU" dirty="0" smtClean="0">
+                <a:latin typeface="Times New Roman" panose="02020603050405020304" pitchFamily="18" charset="0"/>
+                <a:cs typeface="Times New Roman" panose="02020603050405020304" pitchFamily="18" charset="0"/>
+              </a:rPr>
+              <a:t>Кадровый;</a:t>
+            </a:r>
+          </a:p>
+          <a:p>
+            <a:r>
+              <a:rPr lang="ru-RU" dirty="0" smtClean="0">
+                <a:latin typeface="Times New Roman" panose="02020603050405020304" pitchFamily="18" charset="0"/>
+                <a:cs typeface="Times New Roman" panose="02020603050405020304" pitchFamily="18" charset="0"/>
+              </a:rPr>
+              <a:t>Закупки;</a:t>
+            </a:r>
+          </a:p>
+          <a:p>
+            <a:r>
+              <a:rPr lang="ru-RU" dirty="0">
+                <a:latin typeface="Times New Roman" panose="02020603050405020304" pitchFamily="18" charset="0"/>
+                <a:cs typeface="Times New Roman" panose="02020603050405020304" pitchFamily="18" charset="0"/>
+              </a:rPr>
+              <a:t>Продажи</a:t>
+            </a:r>
+            <a:r>
+              <a:rPr lang="ru-RU" dirty="0" smtClean="0">
+                <a:latin typeface="Times New Roman" panose="02020603050405020304" pitchFamily="18" charset="0"/>
+                <a:cs typeface="Times New Roman" panose="02020603050405020304" pitchFamily="18" charset="0"/>
+              </a:rPr>
+              <a:t>;</a:t>
+            </a:r>
+          </a:p>
+          <a:p>
+            <a:r>
+              <a:rPr lang="ru-RU" dirty="0" smtClean="0">
+                <a:latin typeface="Times New Roman" panose="02020603050405020304" pitchFamily="18" charset="0"/>
+                <a:cs typeface="Times New Roman" panose="02020603050405020304" pitchFamily="18" charset="0"/>
+              </a:rPr>
+              <a:t>Ремонтная зона.</a:t>
+            </a:r>
+          </a:p>
+          <a:p>
             <a:endParaRPr lang="ru-RU" dirty="0">
+              <a:latin typeface="Times New Roman" panose="02020603050405020304" pitchFamily="18" charset="0"/>
+              <a:cs typeface="Times New Roman" panose="02020603050405020304" pitchFamily="18" charset="0"/>
+            </a:endParaRPr>
+          </a:p>
+          <a:p>
+            <a:pPr marL="0" indent="0">
+              <a:buNone/>
+            </a:pPr>
+            <a:r>
+              <a:rPr lang="ru-RU" dirty="0" smtClean="0">
+                <a:latin typeface="Times New Roman" panose="02020603050405020304" pitchFamily="18" charset="0"/>
+                <a:cs typeface="Times New Roman" panose="02020603050405020304" pitchFamily="18" charset="0"/>
+              </a:rPr>
+              <a:t>Основная деятельность СТО направлена на извлечение прибыли от ремонта автомобилей. В связи с чем встаёт вопрос контроля загруженности, внутренней логистики и взаимодействия между работниками ремонтной зоны.</a:t>
+            </a:r>
+            <a:endParaRPr lang="ru-RU" dirty="0" smtClean="0">
               <a:latin typeface="Times New Roman" panose="02020603050405020304" pitchFamily="18" charset="0"/>
               <a:cs typeface="Times New Roman" panose="02020603050405020304" pitchFamily="18" charset="0"/>
             </a:endParaRPr>
@@ -4698,7 +4889,7 @@
         </p:spPr>
         <p:txBody>
           <a:bodyPr>
-            <a:normAutofit fontScale="90000"/>
+            <a:normAutofit/>
           </a:bodyPr>
           <a:lstStyle/>
           <a:p>
@@ -4708,12 +4899,8 @@
                 <a:latin typeface="Times New Roman" panose="02020603050405020304" pitchFamily="18" charset="0"/>
                 <a:cs typeface="Times New Roman" panose="02020603050405020304" pitchFamily="18" charset="0"/>
               </a:rPr>
-              <a:t>Проанализировать существующие системы автоматизации работ СТО</a:t>
-            </a:r>
-            <a:endParaRPr lang="ru-RU" sz="4000" dirty="0">
-              <a:latin typeface="Times New Roman" panose="02020603050405020304" pitchFamily="18" charset="0"/>
-              <a:cs typeface="Times New Roman" panose="02020603050405020304" pitchFamily="18" charset="0"/>
-            </a:endParaRPr>
+              <a:t>Изучить алгоритм внутренней логистики СТО</a:t>
+            </a:r>
           </a:p>
         </p:txBody>
       </p:sp>
@@ -4729,8 +4916,8 @@
         </p:nvSpPr>
         <p:spPr>
           <a:xfrm>
-            <a:off x="1022888" y="1921790"/>
-            <a:ext cx="10330912" cy="4525191"/>
+            <a:off x="1022888" y="1593562"/>
+            <a:ext cx="10330912" cy="726852"/>
           </a:xfrm>
         </p:spPr>
         <p:txBody>
@@ -4747,25 +4934,8 @@
                 <a:latin typeface="Times New Roman" panose="02020603050405020304" pitchFamily="18" charset="0"/>
                 <a:cs typeface="Times New Roman" panose="02020603050405020304" pitchFamily="18" charset="0"/>
               </a:rPr>
-              <a:t>Описание решения в соответствии с ВКР</a:t>
-            </a:r>
-          </a:p>
-          <a:p>
-            <a:pPr marL="0" indent="0">
-              <a:buNone/>
-            </a:pPr>
-            <a:r>
-              <a:rPr lang="ru-RU" dirty="0">
-                <a:latin typeface="Times New Roman" panose="02020603050405020304" pitchFamily="18" charset="0"/>
-                <a:cs typeface="Times New Roman" panose="02020603050405020304" pitchFamily="18" charset="0"/>
-              </a:rPr>
-              <a:t>(на каждую задачу может быть несколько слайдов)</a:t>
-            </a:r>
-          </a:p>
-          <a:p>
-            <a:pPr marL="0" indent="0">
-              <a:buNone/>
-            </a:pPr>
+              <a:t>На схеме представлен алгоритм внутренней логистики СТО.</a:t>
+            </a:r>
             <a:endParaRPr lang="ru-RU" dirty="0">
               <a:latin typeface="Times New Roman" panose="02020603050405020304" pitchFamily="18" charset="0"/>
               <a:cs typeface="Times New Roman" panose="02020603050405020304" pitchFamily="18" charset="0"/>
@@ -4773,10 +4943,385 @@
           </a:p>
         </p:txBody>
       </p:sp>
+      <p:sp>
+        <p:nvSpPr>
+          <p:cNvPr id="9" name="Rectangle 4"/>
+          <p:cNvSpPr>
+            <a:spLocks noChangeArrowheads="1"/>
+          </p:cNvSpPr>
+          <p:nvPr/>
+        </p:nvSpPr>
+        <p:spPr bwMode="auto">
+          <a:xfrm>
+            <a:off x="0" y="0"/>
+            <a:ext cx="12192000" cy="457200"/>
+          </a:xfrm>
+          <a:prstGeom prst="rect">
+            <a:avLst/>
+          </a:prstGeom>
+          <a:noFill/>
+          <a:ln>
+            <a:noFill/>
+          </a:ln>
+          <a:effectLst/>
+          <a:extLst>
+            <a:ext uri="{909E8E84-426E-40DD-AFC4-6F175D3DCCD1}">
+              <a14:hiddenFill xmlns:a14="http://schemas.microsoft.com/office/drawing/2010/main">
+                <a:solidFill>
+                  <a:schemeClr val="accent1"/>
+                </a:solidFill>
+              </a14:hiddenFill>
+            </a:ext>
+            <a:ext uri="{91240B29-F687-4F45-9708-019B960494DF}">
+              <a14:hiddenLine xmlns:a14="http://schemas.microsoft.com/office/drawing/2010/main" w="9525">
+                <a:solidFill>
+                  <a:schemeClr val="tx1"/>
+                </a:solidFill>
+                <a:miter lim="800000"/>
+                <a:headEnd/>
+                <a:tailEnd/>
+              </a14:hiddenLine>
+            </a:ext>
+            <a:ext uri="{AF507438-7753-43E0-B8FC-AC1667EBCBE1}">
+              <a14:hiddenEffects xmlns:a14="http://schemas.microsoft.com/office/drawing/2010/main">
+                <a:effectLst>
+                  <a:outerShdw dist="35921" dir="2700000" algn="ctr" rotWithShape="0">
+                    <a:schemeClr val="bg2"/>
+                  </a:outerShdw>
+                </a:effectLst>
+              </a14:hiddenEffects>
+            </a:ext>
+          </a:extLst>
+        </p:spPr>
+        <p:txBody>
+          <a:bodyPr vert="horz" wrap="none" lIns="91440" tIns="45720" rIns="91440" bIns="45720" numCol="1" anchor="ctr" anchorCtr="0" compatLnSpc="1">
+            <a:prstTxWarp prst="textNoShape">
+              <a:avLst/>
+            </a:prstTxWarp>
+            <a:spAutoFit/>
+          </a:bodyPr>
+          <a:lstStyle/>
+          <a:p>
+            <a:endParaRPr lang="ru-RU"/>
+          </a:p>
+        </p:txBody>
+      </p:sp>
+      <p:cxnSp>
+        <p:nvCxnSpPr>
+          <p:cNvPr id="11" name="Прямая со стрелкой 10"/>
+          <p:cNvCxnSpPr>
+            <a:stCxn id="14" idx="2"/>
+            <a:endCxn id="15" idx="0"/>
+          </p:cNvCxnSpPr>
+          <p:nvPr/>
+        </p:nvCxnSpPr>
+        <p:spPr>
+          <a:xfrm>
+            <a:off x="6188344" y="3220414"/>
+            <a:ext cx="0" cy="693354"/>
+          </a:xfrm>
+          <a:prstGeom prst="straightConnector1">
+            <a:avLst/>
+          </a:prstGeom>
+          <a:ln>
+            <a:tailEnd type="triangle"/>
+          </a:ln>
+        </p:spPr>
+        <p:style>
+          <a:lnRef idx="1">
+            <a:schemeClr val="accent1"/>
+          </a:lnRef>
+          <a:fillRef idx="0">
+            <a:schemeClr val="accent1"/>
+          </a:fillRef>
+          <a:effectRef idx="0">
+            <a:schemeClr val="accent1"/>
+          </a:effectRef>
+          <a:fontRef idx="minor">
+            <a:schemeClr val="tx1"/>
+          </a:fontRef>
+        </p:style>
+      </p:cxnSp>
+      <p:cxnSp>
+        <p:nvCxnSpPr>
+          <p:cNvPr id="13" name="Прямая со стрелкой 12"/>
+          <p:cNvCxnSpPr>
+            <a:stCxn id="15" idx="2"/>
+            <a:endCxn id="16" idx="0"/>
+          </p:cNvCxnSpPr>
+          <p:nvPr/>
+        </p:nvCxnSpPr>
+        <p:spPr>
+          <a:xfrm>
+            <a:off x="6188344" y="4813768"/>
+            <a:ext cx="0" cy="693354"/>
+          </a:xfrm>
+          <a:prstGeom prst="straightConnector1">
+            <a:avLst/>
+          </a:prstGeom>
+          <a:ln>
+            <a:tailEnd type="triangle"/>
+          </a:ln>
+        </p:spPr>
+        <p:style>
+          <a:lnRef idx="1">
+            <a:schemeClr val="accent1"/>
+          </a:lnRef>
+          <a:fillRef idx="0">
+            <a:schemeClr val="accent1"/>
+          </a:fillRef>
+          <a:effectRef idx="0">
+            <a:schemeClr val="accent1"/>
+          </a:effectRef>
+          <a:fontRef idx="minor">
+            <a:schemeClr val="tx1"/>
+          </a:fontRef>
+        </p:style>
+      </p:cxnSp>
+      <p:sp>
+        <p:nvSpPr>
+          <p:cNvPr id="14" name="Прямоугольник 1"/>
+          <p:cNvSpPr>
+            <a:spLocks noChangeArrowheads="1"/>
+          </p:cNvSpPr>
+          <p:nvPr/>
+        </p:nvSpPr>
+        <p:spPr bwMode="auto">
+          <a:xfrm>
+            <a:off x="3128344" y="2320414"/>
+            <a:ext cx="6120000" cy="900000"/>
+          </a:xfrm>
+          <a:prstGeom prst="rect">
+            <a:avLst/>
+          </a:prstGeom>
+          <a:solidFill>
+            <a:srgbClr val="5B9BD5"/>
+          </a:solidFill>
+          <a:ln w="12700">
+            <a:solidFill>
+              <a:srgbClr val="1F4D78"/>
+            </a:solidFill>
+            <a:miter lim="800000"/>
+            <a:headEnd/>
+            <a:tailEnd/>
+          </a:ln>
+        </p:spPr>
+        <p:txBody>
+          <a:bodyPr vert="horz" wrap="square" lIns="91440" tIns="45720" rIns="91440" bIns="45720" numCol="1" anchor="ctr" anchorCtr="0" compatLnSpc="1">
+            <a:prstTxWarp prst="textNoShape">
+              <a:avLst/>
+            </a:prstTxWarp>
+          </a:bodyPr>
+          <a:lstStyle/>
+          <a:p>
+            <a:pPr marL="0" marR="0" lvl="0" indent="0" algn="ctr" defTabSz="914400" rtl="0" eaLnBrk="0" fontAlgn="base" latinLnBrk="0" hangingPunct="0">
+              <a:lnSpc>
+                <a:spcPct val="100000"/>
+              </a:lnSpc>
+              <a:spcBef>
+                <a:spcPct val="0"/>
+              </a:spcBef>
+              <a:spcAft>
+                <a:spcPct val="0"/>
+              </a:spcAft>
+              <a:buClrTx/>
+              <a:buSzTx/>
+              <a:buFontTx/>
+              <a:buNone/>
+              <a:tabLst/>
+            </a:pPr>
+            <a:r>
+              <a:rPr kumimoji="0" lang="ru-RU" altLang="ru-RU" sz="2600" b="0" i="0" u="none" strike="noStrike" cap="none" normalizeH="0" baseline="0" dirty="0" smtClean="0">
+                <a:ln>
+                  <a:noFill/>
+                </a:ln>
+                <a:solidFill>
+                  <a:schemeClr val="tx1"/>
+                </a:solidFill>
+                <a:effectLst/>
+                <a:latin typeface="Times New Roman" panose="02020603050405020304" pitchFamily="18" charset="0"/>
+                <a:ea typeface="Calibri" panose="020F0502020204030204" pitchFamily="34" charset="0"/>
+                <a:cs typeface="Times New Roman" panose="02020603050405020304" pitchFamily="18" charset="0"/>
+              </a:rPr>
+              <a:t>Запись клиента на диагностику, менеджером клиентской записи</a:t>
+            </a:r>
+            <a:endParaRPr kumimoji="0" lang="ru-RU" altLang="ru-RU" sz="2600" b="0" i="0" u="none" strike="noStrike" cap="none" normalizeH="0" baseline="0" dirty="0" smtClean="0">
+              <a:ln>
+                <a:noFill/>
+              </a:ln>
+              <a:solidFill>
+                <a:schemeClr val="tx1"/>
+              </a:solidFill>
+              <a:effectLst/>
+              <a:latin typeface="Arial" panose="020B0604020202020204" pitchFamily="34" charset="0"/>
+            </a:endParaRPr>
+          </a:p>
+        </p:txBody>
+      </p:sp>
+      <p:sp>
+        <p:nvSpPr>
+          <p:cNvPr id="15" name="Прямоугольник 2"/>
+          <p:cNvSpPr>
+            <a:spLocks noChangeArrowheads="1"/>
+          </p:cNvSpPr>
+          <p:nvPr/>
+        </p:nvSpPr>
+        <p:spPr bwMode="auto">
+          <a:xfrm>
+            <a:off x="3128344" y="3913768"/>
+            <a:ext cx="6120000" cy="900000"/>
+          </a:xfrm>
+          <a:prstGeom prst="rect">
+            <a:avLst/>
+          </a:prstGeom>
+          <a:solidFill>
+            <a:srgbClr val="5B9BD5"/>
+          </a:solidFill>
+          <a:ln w="12700">
+            <a:solidFill>
+              <a:srgbClr val="1F4D78"/>
+            </a:solidFill>
+            <a:miter lim="800000"/>
+            <a:headEnd/>
+            <a:tailEnd/>
+          </a:ln>
+        </p:spPr>
+        <p:txBody>
+          <a:bodyPr vert="horz" wrap="square" lIns="91440" tIns="45720" rIns="91440" bIns="45720" numCol="1" anchor="ctr" anchorCtr="0" compatLnSpc="1">
+            <a:prstTxWarp prst="textNoShape">
+              <a:avLst/>
+            </a:prstTxWarp>
+          </a:bodyPr>
+          <a:lstStyle/>
+          <a:p>
+            <a:pPr marL="0" marR="0" lvl="0" indent="0" algn="ctr" defTabSz="914400" rtl="0" eaLnBrk="0" fontAlgn="base" latinLnBrk="0" hangingPunct="0">
+              <a:lnSpc>
+                <a:spcPct val="100000"/>
+              </a:lnSpc>
+              <a:spcBef>
+                <a:spcPct val="0"/>
+              </a:spcBef>
+              <a:spcAft>
+                <a:spcPct val="0"/>
+              </a:spcAft>
+              <a:buClrTx/>
+              <a:buSzTx/>
+              <a:buFontTx/>
+              <a:buNone/>
+              <a:tabLst/>
+            </a:pPr>
+            <a:r>
+              <a:rPr kumimoji="0" lang="ru-RU" altLang="ru-RU" sz="2600" b="0" i="0" u="none" strike="noStrike" cap="none" normalizeH="0" baseline="0" dirty="0" smtClean="0">
+                <a:ln>
+                  <a:noFill/>
+                </a:ln>
+                <a:solidFill>
+                  <a:schemeClr val="tx1"/>
+                </a:solidFill>
+                <a:effectLst/>
+                <a:latin typeface="Times New Roman" panose="02020603050405020304" pitchFamily="18" charset="0"/>
+                <a:ea typeface="Calibri" panose="020F0502020204030204" pitchFamily="34" charset="0"/>
+                <a:cs typeface="Times New Roman" panose="02020603050405020304" pitchFamily="18" charset="0"/>
+              </a:rPr>
+              <a:t>Диагностика автомобиля, менеджером диагностических работы</a:t>
+            </a:r>
+            <a:endParaRPr kumimoji="0" lang="ru-RU" altLang="ru-RU" sz="2600" b="0" i="0" u="none" strike="noStrike" cap="none" normalizeH="0" baseline="0" dirty="0" smtClean="0">
+              <a:ln>
+                <a:noFill/>
+              </a:ln>
+              <a:solidFill>
+                <a:schemeClr val="tx1"/>
+              </a:solidFill>
+              <a:effectLst/>
+              <a:latin typeface="Arial" panose="020B0604020202020204" pitchFamily="34" charset="0"/>
+            </a:endParaRPr>
+          </a:p>
+        </p:txBody>
+      </p:sp>
+      <p:sp>
+        <p:nvSpPr>
+          <p:cNvPr id="16" name="Прямоугольник 3"/>
+          <p:cNvSpPr>
+            <a:spLocks noChangeArrowheads="1"/>
+          </p:cNvSpPr>
+          <p:nvPr/>
+        </p:nvSpPr>
+        <p:spPr bwMode="auto">
+          <a:xfrm>
+            <a:off x="3128344" y="5507122"/>
+            <a:ext cx="6120000" cy="900000"/>
+          </a:xfrm>
+          <a:prstGeom prst="rect">
+            <a:avLst/>
+          </a:prstGeom>
+          <a:solidFill>
+            <a:srgbClr val="5B9BD5"/>
+          </a:solidFill>
+          <a:ln w="12700">
+            <a:solidFill>
+              <a:srgbClr val="1F4D78"/>
+            </a:solidFill>
+            <a:miter lim="800000"/>
+            <a:headEnd/>
+            <a:tailEnd/>
+          </a:ln>
+        </p:spPr>
+        <p:txBody>
+          <a:bodyPr vert="horz" wrap="square" lIns="91440" tIns="45720" rIns="91440" bIns="45720" numCol="1" anchor="ctr" anchorCtr="0" compatLnSpc="1">
+            <a:prstTxWarp prst="textNoShape">
+              <a:avLst/>
+            </a:prstTxWarp>
+          </a:bodyPr>
+          <a:lstStyle/>
+          <a:p>
+            <a:pPr marL="0" marR="0" lvl="0" indent="0" algn="ctr" defTabSz="914400" rtl="0" eaLnBrk="0" fontAlgn="base" latinLnBrk="0" hangingPunct="0">
+              <a:lnSpc>
+                <a:spcPct val="100000"/>
+              </a:lnSpc>
+              <a:spcBef>
+                <a:spcPct val="0"/>
+              </a:spcBef>
+              <a:spcAft>
+                <a:spcPct val="0"/>
+              </a:spcAft>
+              <a:buClrTx/>
+              <a:buSzTx/>
+              <a:buFontTx/>
+              <a:buNone/>
+              <a:tabLst/>
+            </a:pPr>
+            <a:r>
+              <a:rPr kumimoji="0" lang="ru-RU" altLang="ru-RU" sz="2600" b="0" i="0" u="none" strike="noStrike" cap="none" normalizeH="0" baseline="0" dirty="0" smtClean="0">
+                <a:ln>
+                  <a:noFill/>
+                </a:ln>
+                <a:solidFill>
+                  <a:schemeClr val="tx1"/>
+                </a:solidFill>
+                <a:effectLst/>
+                <a:latin typeface="Times New Roman" panose="02020603050405020304" pitchFamily="18" charset="0"/>
+                <a:ea typeface="Calibri" panose="020F0502020204030204" pitchFamily="34" charset="0"/>
+                <a:cs typeface="Times New Roman" panose="02020603050405020304" pitchFamily="18" charset="0"/>
+              </a:rPr>
+              <a:t>Сервисное обслуживание, работником ремонтной зоны</a:t>
+            </a:r>
+            <a:endParaRPr kumimoji="0" lang="ru-RU" altLang="ru-RU" sz="2600" b="0" i="0" u="none" strike="noStrike" cap="none" normalizeH="0" baseline="0" dirty="0" smtClean="0">
+              <a:ln>
+                <a:noFill/>
+              </a:ln>
+              <a:solidFill>
+                <a:schemeClr val="tx1"/>
+              </a:solidFill>
+              <a:effectLst/>
+              <a:latin typeface="Arial" panose="020B0604020202020204" pitchFamily="34" charset="0"/>
+            </a:endParaRPr>
+          </a:p>
+        </p:txBody>
+      </p:sp>
     </p:spTree>
     <p:extLst>
       <p:ext uri="{BB962C8B-B14F-4D97-AF65-F5344CB8AC3E}">
-        <p14:creationId xmlns:p14="http://schemas.microsoft.com/office/powerpoint/2010/main" val="58214680"/>
+        <p14:creationId xmlns:p14="http://schemas.microsoft.com/office/powerpoint/2010/main" val="1219712064"/>
       </p:ext>
     </p:extLst>
   </p:cSld>
@@ -4840,7 +5385,7 @@
         </p:spPr>
         <p:txBody>
           <a:bodyPr>
-            <a:normAutofit/>
+            <a:normAutofit fontScale="90000"/>
           </a:bodyPr>
           <a:lstStyle/>
           <a:p>
@@ -4850,7 +5395,14 @@
                 <a:latin typeface="Times New Roman" panose="02020603050405020304" pitchFamily="18" charset="0"/>
                 <a:cs typeface="Times New Roman" panose="02020603050405020304" pitchFamily="18" charset="0"/>
               </a:rPr>
-              <a:t>Изучить алгоритм внутренней логистики СТО</a:t>
+              <a:t>Проанализировать существующие системы </a:t>
+            </a:r>
+            <a:r>
+              <a:rPr lang="ru-RU" sz="4000" dirty="0" smtClean="0">
+                <a:latin typeface="Times New Roman" panose="02020603050405020304" pitchFamily="18" charset="0"/>
+                <a:cs typeface="Times New Roman" panose="02020603050405020304" pitchFamily="18" charset="0"/>
+              </a:rPr>
+              <a:t>контроля работы СТО</a:t>
             </a:r>
             <a:endParaRPr lang="ru-RU" sz="4000" dirty="0">
               <a:latin typeface="Times New Roman" panose="02020603050405020304" pitchFamily="18" charset="0"/>
@@ -4889,25 +5441,48 @@
                 <a:latin typeface="Times New Roman" panose="02020603050405020304" pitchFamily="18" charset="0"/>
                 <a:cs typeface="Times New Roman" panose="02020603050405020304" pitchFamily="18" charset="0"/>
               </a:rPr>
-              <a:t>Описание решения в соответствии с ВКР</a:t>
-            </a:r>
-          </a:p>
-          <a:p>
-            <a:pPr marL="0" indent="0">
-              <a:buNone/>
-            </a:pPr>
-            <a:r>
-              <a:rPr lang="ru-RU" dirty="0">
+              <a:t>Список часто используемых систем автоматизации работы СТО:</a:t>
+            </a:r>
+          </a:p>
+          <a:p>
+            <a:r>
+              <a:rPr lang="en-US" dirty="0" err="1" smtClean="0">
                 <a:latin typeface="Times New Roman" panose="02020603050405020304" pitchFamily="18" charset="0"/>
                 <a:cs typeface="Times New Roman" panose="02020603050405020304" pitchFamily="18" charset="0"/>
               </a:rPr>
-              <a:t>(на каждую задачу может быть несколько слайдов)</a:t>
-            </a:r>
-          </a:p>
-          <a:p>
-            <a:pPr marL="0" indent="0">
-              <a:buNone/>
-            </a:pPr>
+              <a:t>AutoDealer</a:t>
+            </a:r>
+            <a:endParaRPr lang="en-US" dirty="0" smtClean="0">
+              <a:latin typeface="Times New Roman" panose="02020603050405020304" pitchFamily="18" charset="0"/>
+              <a:cs typeface="Times New Roman" panose="02020603050405020304" pitchFamily="18" charset="0"/>
+            </a:endParaRPr>
+          </a:p>
+          <a:p>
+            <a:r>
+              <a:rPr lang="en-US" dirty="0" smtClean="0">
+                <a:latin typeface="Times New Roman" panose="02020603050405020304" pitchFamily="18" charset="0"/>
+                <a:cs typeface="Times New Roman" panose="02020603050405020304" pitchFamily="18" charset="0"/>
+              </a:rPr>
+              <a:t>Excel</a:t>
+            </a:r>
+          </a:p>
+          <a:p>
+            <a:r>
+              <a:rPr lang="ru-RU" dirty="0" smtClean="0">
+                <a:latin typeface="Times New Roman" panose="02020603050405020304" pitchFamily="18" charset="0"/>
+                <a:cs typeface="Times New Roman" panose="02020603050405020304" pitchFamily="18" charset="0"/>
+              </a:rPr>
+              <a:t>1С: Автосервис</a:t>
+            </a:r>
+          </a:p>
+          <a:p>
+            <a:r>
+              <a:rPr lang="ru-RU" dirty="0" smtClean="0">
+                <a:latin typeface="Times New Roman" panose="02020603050405020304" pitchFamily="18" charset="0"/>
+                <a:cs typeface="Times New Roman" panose="02020603050405020304" pitchFamily="18" charset="0"/>
+              </a:rPr>
+              <a:t>Бумажный учёт</a:t>
+            </a:r>
             <a:endParaRPr lang="ru-RU" dirty="0">
               <a:latin typeface="Times New Roman" panose="02020603050405020304" pitchFamily="18" charset="0"/>
               <a:cs typeface="Times New Roman" panose="02020603050405020304" pitchFamily="18" charset="0"/>
@@ -4918,7 +5493,7 @@
     </p:spTree>
     <p:extLst>
       <p:ext uri="{BB962C8B-B14F-4D97-AF65-F5344CB8AC3E}">
-        <p14:creationId xmlns:p14="http://schemas.microsoft.com/office/powerpoint/2010/main" val="1219712064"/>
+        <p14:creationId xmlns:p14="http://schemas.microsoft.com/office/powerpoint/2010/main" val="58214680"/>
       </p:ext>
     </p:extLst>
   </p:cSld>
@@ -4982,7 +5557,7 @@
         </p:spPr>
         <p:txBody>
           <a:bodyPr>
-            <a:normAutofit/>
+            <a:normAutofit fontScale="90000"/>
           </a:bodyPr>
           <a:lstStyle/>
           <a:p>
@@ -4992,19 +5567,8 @@
                 <a:latin typeface="Times New Roman" panose="02020603050405020304" pitchFamily="18" charset="0"/>
                 <a:cs typeface="Times New Roman" panose="02020603050405020304" pitchFamily="18" charset="0"/>
               </a:rPr>
-              <a:t>Разработать готовую </a:t>
-            </a:r>
-            <a:r>
-              <a:rPr lang="ru-RU" sz="4000" dirty="0" smtClean="0">
-                <a:latin typeface="Times New Roman" panose="02020603050405020304" pitchFamily="18" charset="0"/>
-                <a:cs typeface="Times New Roman" panose="02020603050405020304" pitchFamily="18" charset="0"/>
-              </a:rPr>
-              <a:t>ИС работы СТО</a:t>
-            </a:r>
-            <a:endParaRPr lang="ru-RU" sz="4000" dirty="0">
-              <a:latin typeface="Times New Roman" panose="02020603050405020304" pitchFamily="18" charset="0"/>
-              <a:cs typeface="Times New Roman" panose="02020603050405020304" pitchFamily="18" charset="0"/>
-            </a:endParaRPr>
+              <a:t>Проанализировать существующие системы автоматизации работ СТО</a:t>
+            </a:r>
           </a:p>
         </p:txBody>
       </p:sp>
@@ -5020,7 +5584,7 @@
         </p:nvSpPr>
         <p:spPr>
           <a:xfrm>
-            <a:off x="1022888" y="1921790"/>
+            <a:off x="1022888" y="1646487"/>
             <a:ext cx="10330912" cy="4525191"/>
           </a:xfrm>
         </p:spPr>
@@ -5038,20 +5602,13 @@
                 <a:latin typeface="Times New Roman" panose="02020603050405020304" pitchFamily="18" charset="0"/>
                 <a:cs typeface="Times New Roman" panose="02020603050405020304" pitchFamily="18" charset="0"/>
               </a:rPr>
-              <a:t>Описание решения в соответствии с ВКР</a:t>
+              <a:t>Сравнение систем автоматизации работы СТО.</a:t>
             </a:r>
           </a:p>
           <a:p>
             <a:pPr marL="0" indent="0">
               <a:buNone/>
             </a:pPr>
-            <a:r>
-              <a:rPr lang="ru-RU" dirty="0" smtClean="0">
-                <a:latin typeface="Times New Roman" panose="02020603050405020304" pitchFamily="18" charset="0"/>
-                <a:cs typeface="Times New Roman" panose="02020603050405020304" pitchFamily="18" charset="0"/>
-              </a:rPr>
-              <a:t>(скриншоты разработанной программы)</a:t>
-            </a:r>
             <a:endParaRPr lang="ru-RU" dirty="0">
               <a:latin typeface="Times New Roman" panose="02020603050405020304" pitchFamily="18" charset="0"/>
               <a:cs typeface="Times New Roman" panose="02020603050405020304" pitchFamily="18" charset="0"/>
@@ -5059,10 +5616,966 @@
           </a:p>
         </p:txBody>
       </p:sp>
+      <p:graphicFrame>
+        <p:nvGraphicFramePr>
+          <p:cNvPr id="6" name="Таблица 5"/>
+          <p:cNvGraphicFramePr>
+            <a:graphicFrameLocks noGrp="1"/>
+          </p:cNvGraphicFramePr>
+          <p:nvPr>
+            <p:extLst>
+              <p:ext uri="{D42A27DB-BD31-4B8C-83A1-F6EECF244321}">
+                <p14:modId xmlns:p14="http://schemas.microsoft.com/office/powerpoint/2010/main" val="2790516918"/>
+              </p:ext>
+            </p:extLst>
+          </p:nvPr>
+        </p:nvGraphicFramePr>
+        <p:xfrm>
+          <a:off x="1056000" y="2075229"/>
+          <a:ext cx="10080000" cy="4690080"/>
+        </p:xfrm>
+        <a:graphic>
+          <a:graphicData uri="http://schemas.openxmlformats.org/drawingml/2006/table">
+            <a:tbl>
+              <a:tblPr firstRow="1" bandRow="1">
+                <a:tableStyleId>{5C22544A-7EE6-4342-B048-85BDC9FD1C3A}</a:tableStyleId>
+              </a:tblPr>
+              <a:tblGrid>
+                <a:gridCol w="2440681">
+                  <a:extLst>
+                    <a:ext uri="{9D8B030D-6E8A-4147-A177-3AD203B41FA5}">
+                      <a16:colId xmlns:a16="http://schemas.microsoft.com/office/drawing/2014/main" val="75834738"/>
+                    </a:ext>
+                  </a:extLst>
+                </a:gridCol>
+                <a:gridCol w="1909753">
+                  <a:extLst>
+                    <a:ext uri="{9D8B030D-6E8A-4147-A177-3AD203B41FA5}">
+                      <a16:colId xmlns:a16="http://schemas.microsoft.com/office/drawing/2014/main" val="1352114430"/>
+                    </a:ext>
+                  </a:extLst>
+                </a:gridCol>
+                <a:gridCol w="1909753">
+                  <a:extLst>
+                    <a:ext uri="{9D8B030D-6E8A-4147-A177-3AD203B41FA5}">
+                      <a16:colId xmlns:a16="http://schemas.microsoft.com/office/drawing/2014/main" val="1271858762"/>
+                    </a:ext>
+                  </a:extLst>
+                </a:gridCol>
+                <a:gridCol w="1909753">
+                  <a:extLst>
+                    <a:ext uri="{9D8B030D-6E8A-4147-A177-3AD203B41FA5}">
+                      <a16:colId xmlns:a16="http://schemas.microsoft.com/office/drawing/2014/main" val="1720581951"/>
+                    </a:ext>
+                  </a:extLst>
+                </a:gridCol>
+                <a:gridCol w="1910060">
+                  <a:extLst>
+                    <a:ext uri="{9D8B030D-6E8A-4147-A177-3AD203B41FA5}">
+                      <a16:colId xmlns:a16="http://schemas.microsoft.com/office/drawing/2014/main" val="1644537101"/>
+                    </a:ext>
+                  </a:extLst>
+                </a:gridCol>
+              </a:tblGrid>
+              <a:tr h="405000">
+                <a:tc>
+                  <a:txBody>
+                    <a:bodyPr/>
+                    <a:lstStyle/>
+                    <a:p>
+                      <a:endParaRPr lang="ru-RU" dirty="0"/>
+                    </a:p>
+                  </a:txBody>
+                  <a:tcPr/>
+                </a:tc>
+                <a:tc>
+                  <a:txBody>
+                    <a:bodyPr/>
+                    <a:lstStyle/>
+                    <a:p>
+                      <a:pPr algn="ctr"/>
+                      <a:r>
+                        <a:rPr lang="en-US" dirty="0" err="1" smtClean="0"/>
+                        <a:t>AutoDealer</a:t>
+                      </a:r>
+                      <a:endParaRPr lang="ru-RU" dirty="0"/>
+                    </a:p>
+                  </a:txBody>
+                  <a:tcPr/>
+                </a:tc>
+                <a:tc>
+                  <a:txBody>
+                    <a:bodyPr/>
+                    <a:lstStyle/>
+                    <a:p>
+                      <a:pPr algn="ctr"/>
+                      <a:r>
+                        <a:rPr lang="en-US" dirty="0" smtClean="0"/>
+                        <a:t>Excel</a:t>
+                      </a:r>
+                      <a:endParaRPr lang="ru-RU" dirty="0"/>
+                    </a:p>
+                  </a:txBody>
+                  <a:tcPr/>
+                </a:tc>
+                <a:tc>
+                  <a:txBody>
+                    <a:bodyPr/>
+                    <a:lstStyle/>
+                    <a:p>
+                      <a:pPr algn="ctr"/>
+                      <a:r>
+                        <a:rPr lang="ru-RU" dirty="0" smtClean="0"/>
+                        <a:t>1С:</a:t>
+                      </a:r>
+                      <a:r>
+                        <a:rPr lang="ru-RU" baseline="0" dirty="0" smtClean="0"/>
+                        <a:t> Автосервис</a:t>
+                      </a:r>
+                      <a:endParaRPr lang="ru-RU" dirty="0"/>
+                    </a:p>
+                  </a:txBody>
+                  <a:tcPr/>
+                </a:tc>
+                <a:tc>
+                  <a:txBody>
+                    <a:bodyPr/>
+                    <a:lstStyle/>
+                    <a:p>
+                      <a:pPr algn="ctr"/>
+                      <a:r>
+                        <a:rPr lang="ru-RU" dirty="0" smtClean="0"/>
+                        <a:t>Бумажный учёт</a:t>
+                      </a:r>
+                      <a:endParaRPr lang="ru-RU" dirty="0"/>
+                    </a:p>
+                  </a:txBody>
+                  <a:tcPr/>
+                </a:tc>
+                <a:extLst>
+                  <a:ext uri="{0D108BD9-81ED-4DB2-BD59-A6C34878D82A}">
+                    <a16:rowId xmlns:a16="http://schemas.microsoft.com/office/drawing/2014/main" val="385688477"/>
+                  </a:ext>
+                </a:extLst>
+              </a:tr>
+              <a:tr h="405000">
+                <a:tc>
+                  <a:txBody>
+                    <a:bodyPr/>
+                    <a:lstStyle/>
+                    <a:p>
+                      <a:r>
+                        <a:rPr lang="ru-RU" dirty="0" smtClean="0"/>
+                        <a:t>Надёжность</a:t>
+                      </a:r>
+                      <a:endParaRPr lang="ru-RU" dirty="0"/>
+                    </a:p>
+                  </a:txBody>
+                  <a:tcPr/>
+                </a:tc>
+                <a:tc>
+                  <a:txBody>
+                    <a:bodyPr/>
+                    <a:lstStyle/>
+                    <a:p>
+                      <a:pPr algn="ctr"/>
+                      <a:r>
+                        <a:rPr lang="ru-RU" dirty="0" smtClean="0"/>
+                        <a:t>3</a:t>
+                      </a:r>
+                      <a:endParaRPr lang="ru-RU" dirty="0"/>
+                    </a:p>
+                  </a:txBody>
+                  <a:tcPr/>
+                </a:tc>
+                <a:tc>
+                  <a:txBody>
+                    <a:bodyPr/>
+                    <a:lstStyle/>
+                    <a:p>
+                      <a:pPr algn="ctr"/>
+                      <a:r>
+                        <a:rPr lang="ru-RU" dirty="0" smtClean="0"/>
+                        <a:t>1</a:t>
+                      </a:r>
+                      <a:endParaRPr lang="ru-RU" dirty="0"/>
+                    </a:p>
+                  </a:txBody>
+                  <a:tcPr/>
+                </a:tc>
+                <a:tc>
+                  <a:txBody>
+                    <a:bodyPr/>
+                    <a:lstStyle/>
+                    <a:p>
+                      <a:pPr algn="ctr"/>
+                      <a:r>
+                        <a:rPr lang="ru-RU" dirty="0" smtClean="0"/>
+                        <a:t>3</a:t>
+                      </a:r>
+                      <a:endParaRPr lang="ru-RU" dirty="0"/>
+                    </a:p>
+                  </a:txBody>
+                  <a:tcPr/>
+                </a:tc>
+                <a:tc>
+                  <a:txBody>
+                    <a:bodyPr/>
+                    <a:lstStyle/>
+                    <a:p>
+                      <a:pPr algn="ctr"/>
+                      <a:r>
+                        <a:rPr lang="ru-RU" dirty="0" smtClean="0"/>
+                        <a:t>1</a:t>
+                      </a:r>
+                      <a:endParaRPr lang="ru-RU" dirty="0"/>
+                    </a:p>
+                  </a:txBody>
+                  <a:tcPr/>
+                </a:tc>
+                <a:extLst>
+                  <a:ext uri="{0D108BD9-81ED-4DB2-BD59-A6C34878D82A}">
+                    <a16:rowId xmlns:a16="http://schemas.microsoft.com/office/drawing/2014/main" val="3097026396"/>
+                  </a:ext>
+                </a:extLst>
+              </a:tr>
+              <a:tr h="405000">
+                <a:tc>
+                  <a:txBody>
+                    <a:bodyPr/>
+                    <a:lstStyle/>
+                    <a:p>
+                      <a:r>
+                        <a:rPr lang="ru-RU" dirty="0" smtClean="0"/>
+                        <a:t>Функциональность</a:t>
+                      </a:r>
+                      <a:endParaRPr lang="ru-RU" dirty="0"/>
+                    </a:p>
+                  </a:txBody>
+                  <a:tcPr/>
+                </a:tc>
+                <a:tc>
+                  <a:txBody>
+                    <a:bodyPr/>
+                    <a:lstStyle/>
+                    <a:p>
+                      <a:pPr algn="ctr"/>
+                      <a:r>
+                        <a:rPr lang="ru-RU" dirty="0" smtClean="0"/>
+                        <a:t>3</a:t>
+                      </a:r>
+                      <a:endParaRPr lang="ru-RU" dirty="0"/>
+                    </a:p>
+                  </a:txBody>
+                  <a:tcPr/>
+                </a:tc>
+                <a:tc>
+                  <a:txBody>
+                    <a:bodyPr/>
+                    <a:lstStyle/>
+                    <a:p>
+                      <a:pPr algn="ctr"/>
+                      <a:r>
+                        <a:rPr lang="ru-RU" dirty="0" smtClean="0"/>
+                        <a:t>1</a:t>
+                      </a:r>
+                      <a:endParaRPr lang="ru-RU" dirty="0"/>
+                    </a:p>
+                  </a:txBody>
+                  <a:tcPr/>
+                </a:tc>
+                <a:tc>
+                  <a:txBody>
+                    <a:bodyPr/>
+                    <a:lstStyle/>
+                    <a:p>
+                      <a:pPr algn="ctr"/>
+                      <a:r>
+                        <a:rPr lang="ru-RU" dirty="0" smtClean="0"/>
+                        <a:t>3</a:t>
+                      </a:r>
+                      <a:endParaRPr lang="ru-RU" dirty="0"/>
+                    </a:p>
+                  </a:txBody>
+                  <a:tcPr/>
+                </a:tc>
+                <a:tc>
+                  <a:txBody>
+                    <a:bodyPr/>
+                    <a:lstStyle/>
+                    <a:p>
+                      <a:pPr algn="ctr"/>
+                      <a:r>
+                        <a:rPr lang="ru-RU" dirty="0" smtClean="0"/>
+                        <a:t>1</a:t>
+                      </a:r>
+                      <a:endParaRPr lang="ru-RU" dirty="0"/>
+                    </a:p>
+                  </a:txBody>
+                  <a:tcPr/>
+                </a:tc>
+                <a:extLst>
+                  <a:ext uri="{0D108BD9-81ED-4DB2-BD59-A6C34878D82A}">
+                    <a16:rowId xmlns:a16="http://schemas.microsoft.com/office/drawing/2014/main" val="2586420275"/>
+                  </a:ext>
+                </a:extLst>
+              </a:tr>
+              <a:tr h="405000">
+                <a:tc>
+                  <a:txBody>
+                    <a:bodyPr/>
+                    <a:lstStyle/>
+                    <a:p>
+                      <a:r>
+                        <a:rPr lang="ru-RU" dirty="0" smtClean="0"/>
+                        <a:t>Стоимость</a:t>
+                      </a:r>
+                      <a:endParaRPr lang="ru-RU" dirty="0"/>
+                    </a:p>
+                  </a:txBody>
+                  <a:tcPr/>
+                </a:tc>
+                <a:tc>
+                  <a:txBody>
+                    <a:bodyPr/>
+                    <a:lstStyle/>
+                    <a:p>
+                      <a:pPr algn="ctr"/>
+                      <a:r>
+                        <a:rPr lang="ru-RU" dirty="0" smtClean="0"/>
+                        <a:t>2</a:t>
+                      </a:r>
+                      <a:endParaRPr lang="ru-RU" dirty="0"/>
+                    </a:p>
+                  </a:txBody>
+                  <a:tcPr/>
+                </a:tc>
+                <a:tc>
+                  <a:txBody>
+                    <a:bodyPr/>
+                    <a:lstStyle/>
+                    <a:p>
+                      <a:pPr algn="ctr"/>
+                      <a:r>
+                        <a:rPr lang="ru-RU" dirty="0" smtClean="0"/>
+                        <a:t>3</a:t>
+                      </a:r>
+                      <a:endParaRPr lang="ru-RU" dirty="0"/>
+                    </a:p>
+                  </a:txBody>
+                  <a:tcPr/>
+                </a:tc>
+                <a:tc>
+                  <a:txBody>
+                    <a:bodyPr/>
+                    <a:lstStyle/>
+                    <a:p>
+                      <a:pPr algn="ctr"/>
+                      <a:r>
+                        <a:rPr lang="ru-RU" dirty="0" smtClean="0"/>
+                        <a:t>1</a:t>
+                      </a:r>
+                      <a:endParaRPr lang="ru-RU" dirty="0"/>
+                    </a:p>
+                  </a:txBody>
+                  <a:tcPr/>
+                </a:tc>
+                <a:tc>
+                  <a:txBody>
+                    <a:bodyPr/>
+                    <a:lstStyle/>
+                    <a:p>
+                      <a:pPr algn="ctr"/>
+                      <a:r>
+                        <a:rPr lang="ru-RU" dirty="0" smtClean="0"/>
+                        <a:t>3</a:t>
+                      </a:r>
+                      <a:endParaRPr lang="ru-RU" dirty="0"/>
+                    </a:p>
+                  </a:txBody>
+                  <a:tcPr/>
+                </a:tc>
+                <a:extLst>
+                  <a:ext uri="{0D108BD9-81ED-4DB2-BD59-A6C34878D82A}">
+                    <a16:rowId xmlns:a16="http://schemas.microsoft.com/office/drawing/2014/main" val="874343576"/>
+                  </a:ext>
+                </a:extLst>
+              </a:tr>
+              <a:tr h="405000">
+                <a:tc>
+                  <a:txBody>
+                    <a:bodyPr/>
+                    <a:lstStyle/>
+                    <a:p>
+                      <a:r>
+                        <a:rPr lang="ru-RU" dirty="0" smtClean="0"/>
+                        <a:t>Понятность</a:t>
+                      </a:r>
+                      <a:endParaRPr lang="ru-RU" dirty="0"/>
+                    </a:p>
+                  </a:txBody>
+                  <a:tcPr/>
+                </a:tc>
+                <a:tc>
+                  <a:txBody>
+                    <a:bodyPr/>
+                    <a:lstStyle/>
+                    <a:p>
+                      <a:pPr algn="ctr"/>
+                      <a:r>
+                        <a:rPr lang="ru-RU" dirty="0" smtClean="0"/>
+                        <a:t>2</a:t>
+                      </a:r>
+                      <a:endParaRPr lang="ru-RU" dirty="0"/>
+                    </a:p>
+                  </a:txBody>
+                  <a:tcPr/>
+                </a:tc>
+                <a:tc>
+                  <a:txBody>
+                    <a:bodyPr/>
+                    <a:lstStyle/>
+                    <a:p>
+                      <a:pPr algn="ctr"/>
+                      <a:r>
+                        <a:rPr lang="ru-RU" dirty="0" smtClean="0"/>
+                        <a:t>3</a:t>
+                      </a:r>
+                      <a:endParaRPr lang="ru-RU" dirty="0"/>
+                    </a:p>
+                  </a:txBody>
+                  <a:tcPr/>
+                </a:tc>
+                <a:tc>
+                  <a:txBody>
+                    <a:bodyPr/>
+                    <a:lstStyle/>
+                    <a:p>
+                      <a:pPr algn="ctr"/>
+                      <a:r>
+                        <a:rPr lang="ru-RU" dirty="0" smtClean="0"/>
+                        <a:t>2</a:t>
+                      </a:r>
+                      <a:endParaRPr lang="ru-RU" dirty="0"/>
+                    </a:p>
+                  </a:txBody>
+                  <a:tcPr/>
+                </a:tc>
+                <a:tc>
+                  <a:txBody>
+                    <a:bodyPr/>
+                    <a:lstStyle/>
+                    <a:p>
+                      <a:pPr algn="ctr"/>
+                      <a:r>
+                        <a:rPr lang="ru-RU" dirty="0" smtClean="0"/>
+                        <a:t>1</a:t>
+                      </a:r>
+                      <a:endParaRPr lang="ru-RU" dirty="0"/>
+                    </a:p>
+                  </a:txBody>
+                  <a:tcPr/>
+                </a:tc>
+                <a:extLst>
+                  <a:ext uri="{0D108BD9-81ED-4DB2-BD59-A6C34878D82A}">
+                    <a16:rowId xmlns:a16="http://schemas.microsoft.com/office/drawing/2014/main" val="763881796"/>
+                  </a:ext>
+                </a:extLst>
+              </a:tr>
+              <a:tr h="405000">
+                <a:tc>
+                  <a:txBody>
+                    <a:bodyPr/>
+                    <a:lstStyle/>
+                    <a:p>
+                      <a:r>
+                        <a:rPr lang="ru-RU" dirty="0" smtClean="0"/>
+                        <a:t>Наполняемость информацией</a:t>
+                      </a:r>
+                      <a:endParaRPr lang="ru-RU" dirty="0"/>
+                    </a:p>
+                  </a:txBody>
+                  <a:tcPr/>
+                </a:tc>
+                <a:tc>
+                  <a:txBody>
+                    <a:bodyPr/>
+                    <a:lstStyle/>
+                    <a:p>
+                      <a:pPr algn="ctr"/>
+                      <a:r>
+                        <a:rPr lang="ru-RU" dirty="0" smtClean="0"/>
+                        <a:t>3</a:t>
+                      </a:r>
+                      <a:endParaRPr lang="ru-RU" dirty="0"/>
+                    </a:p>
+                  </a:txBody>
+                  <a:tcPr/>
+                </a:tc>
+                <a:tc>
+                  <a:txBody>
+                    <a:bodyPr/>
+                    <a:lstStyle/>
+                    <a:p>
+                      <a:pPr algn="ctr"/>
+                      <a:r>
+                        <a:rPr lang="ru-RU" dirty="0" smtClean="0"/>
+                        <a:t>3</a:t>
+                      </a:r>
+                      <a:endParaRPr lang="ru-RU" dirty="0"/>
+                    </a:p>
+                  </a:txBody>
+                  <a:tcPr/>
+                </a:tc>
+                <a:tc>
+                  <a:txBody>
+                    <a:bodyPr/>
+                    <a:lstStyle/>
+                    <a:p>
+                      <a:pPr algn="ctr"/>
+                      <a:r>
+                        <a:rPr lang="ru-RU" dirty="0" smtClean="0"/>
+                        <a:t>3</a:t>
+                      </a:r>
+                      <a:endParaRPr lang="ru-RU" dirty="0"/>
+                    </a:p>
+                  </a:txBody>
+                  <a:tcPr/>
+                </a:tc>
+                <a:tc>
+                  <a:txBody>
+                    <a:bodyPr/>
+                    <a:lstStyle/>
+                    <a:p>
+                      <a:pPr algn="ctr"/>
+                      <a:r>
+                        <a:rPr lang="ru-RU" dirty="0" smtClean="0"/>
+                        <a:t>1</a:t>
+                      </a:r>
+                      <a:endParaRPr lang="ru-RU" dirty="0"/>
+                    </a:p>
+                  </a:txBody>
+                  <a:tcPr/>
+                </a:tc>
+                <a:extLst>
+                  <a:ext uri="{0D108BD9-81ED-4DB2-BD59-A6C34878D82A}">
+                    <a16:rowId xmlns:a16="http://schemas.microsoft.com/office/drawing/2014/main" val="4210317727"/>
+                  </a:ext>
+                </a:extLst>
+              </a:tr>
+              <a:tr h="405000">
+                <a:tc>
+                  <a:txBody>
+                    <a:bodyPr/>
+                    <a:lstStyle/>
+                    <a:p>
+                      <a:r>
+                        <a:rPr lang="ru-RU" dirty="0" smtClean="0"/>
+                        <a:t>Обучаемость</a:t>
+                      </a:r>
+                      <a:endParaRPr lang="ru-RU" dirty="0"/>
+                    </a:p>
+                  </a:txBody>
+                  <a:tcPr/>
+                </a:tc>
+                <a:tc>
+                  <a:txBody>
+                    <a:bodyPr/>
+                    <a:lstStyle/>
+                    <a:p>
+                      <a:pPr algn="ctr"/>
+                      <a:r>
+                        <a:rPr lang="ru-RU" dirty="0" smtClean="0"/>
+                        <a:t>2</a:t>
+                      </a:r>
+                      <a:endParaRPr lang="ru-RU" dirty="0"/>
+                    </a:p>
+                  </a:txBody>
+                  <a:tcPr/>
+                </a:tc>
+                <a:tc>
+                  <a:txBody>
+                    <a:bodyPr/>
+                    <a:lstStyle/>
+                    <a:p>
+                      <a:pPr algn="ctr"/>
+                      <a:r>
+                        <a:rPr lang="ru-RU" dirty="0" smtClean="0"/>
+                        <a:t>3</a:t>
+                      </a:r>
+                      <a:endParaRPr lang="ru-RU" dirty="0"/>
+                    </a:p>
+                  </a:txBody>
+                  <a:tcPr/>
+                </a:tc>
+                <a:tc>
+                  <a:txBody>
+                    <a:bodyPr/>
+                    <a:lstStyle/>
+                    <a:p>
+                      <a:pPr algn="ctr"/>
+                      <a:r>
+                        <a:rPr lang="ru-RU" dirty="0" smtClean="0"/>
+                        <a:t>1</a:t>
+                      </a:r>
+                      <a:endParaRPr lang="ru-RU" dirty="0"/>
+                    </a:p>
+                  </a:txBody>
+                  <a:tcPr/>
+                </a:tc>
+                <a:tc>
+                  <a:txBody>
+                    <a:bodyPr/>
+                    <a:lstStyle/>
+                    <a:p>
+                      <a:pPr algn="ctr"/>
+                      <a:r>
+                        <a:rPr lang="ru-RU" dirty="0" smtClean="0"/>
+                        <a:t>2</a:t>
+                      </a:r>
+                      <a:endParaRPr lang="ru-RU" dirty="0"/>
+                    </a:p>
+                  </a:txBody>
+                  <a:tcPr/>
+                </a:tc>
+                <a:extLst>
+                  <a:ext uri="{0D108BD9-81ED-4DB2-BD59-A6C34878D82A}">
+                    <a16:rowId xmlns:a16="http://schemas.microsoft.com/office/drawing/2014/main" val="1750066985"/>
+                  </a:ext>
+                </a:extLst>
+              </a:tr>
+              <a:tr h="405000">
+                <a:tc>
+                  <a:txBody>
+                    <a:bodyPr/>
+                    <a:lstStyle/>
+                    <a:p>
+                      <a:r>
+                        <a:rPr lang="ru-RU" dirty="0" err="1" smtClean="0"/>
+                        <a:t>Нагруженость</a:t>
+                      </a:r>
+                      <a:endParaRPr lang="ru-RU" dirty="0"/>
+                    </a:p>
+                  </a:txBody>
+                  <a:tcPr/>
+                </a:tc>
+                <a:tc>
+                  <a:txBody>
+                    <a:bodyPr/>
+                    <a:lstStyle/>
+                    <a:p>
+                      <a:pPr algn="ctr"/>
+                      <a:r>
+                        <a:rPr lang="ru-RU" dirty="0" smtClean="0"/>
+                        <a:t>1</a:t>
+                      </a:r>
+                      <a:endParaRPr lang="ru-RU" dirty="0"/>
+                    </a:p>
+                  </a:txBody>
+                  <a:tcPr/>
+                </a:tc>
+                <a:tc>
+                  <a:txBody>
+                    <a:bodyPr/>
+                    <a:lstStyle/>
+                    <a:p>
+                      <a:pPr algn="ctr"/>
+                      <a:r>
+                        <a:rPr lang="ru-RU" dirty="0" smtClean="0"/>
+                        <a:t>3</a:t>
+                      </a:r>
+                      <a:endParaRPr lang="ru-RU" dirty="0"/>
+                    </a:p>
+                  </a:txBody>
+                  <a:tcPr/>
+                </a:tc>
+                <a:tc>
+                  <a:txBody>
+                    <a:bodyPr/>
+                    <a:lstStyle/>
+                    <a:p>
+                      <a:pPr algn="ctr"/>
+                      <a:r>
+                        <a:rPr lang="ru-RU" dirty="0" smtClean="0"/>
+                        <a:t>2</a:t>
+                      </a:r>
+                      <a:endParaRPr lang="ru-RU" dirty="0"/>
+                    </a:p>
+                  </a:txBody>
+                  <a:tcPr/>
+                </a:tc>
+                <a:tc>
+                  <a:txBody>
+                    <a:bodyPr/>
+                    <a:lstStyle/>
+                    <a:p>
+                      <a:pPr algn="ctr"/>
+                      <a:r>
+                        <a:rPr lang="ru-RU" dirty="0" smtClean="0"/>
+                        <a:t>1</a:t>
+                      </a:r>
+                      <a:endParaRPr lang="ru-RU" dirty="0"/>
+                    </a:p>
+                  </a:txBody>
+                  <a:tcPr/>
+                </a:tc>
+                <a:extLst>
+                  <a:ext uri="{0D108BD9-81ED-4DB2-BD59-A6C34878D82A}">
+                    <a16:rowId xmlns:a16="http://schemas.microsoft.com/office/drawing/2014/main" val="3170755826"/>
+                  </a:ext>
+                </a:extLst>
+              </a:tr>
+              <a:tr h="405000">
+                <a:tc>
+                  <a:txBody>
+                    <a:bodyPr/>
+                    <a:lstStyle/>
+                    <a:p>
+                      <a:r>
+                        <a:rPr lang="ru-RU" dirty="0" smtClean="0"/>
+                        <a:t>Структурированность</a:t>
+                      </a:r>
+                      <a:endParaRPr lang="ru-RU" dirty="0"/>
+                    </a:p>
+                  </a:txBody>
+                  <a:tcPr/>
+                </a:tc>
+                <a:tc>
+                  <a:txBody>
+                    <a:bodyPr/>
+                    <a:lstStyle/>
+                    <a:p>
+                      <a:pPr algn="ctr"/>
+                      <a:r>
+                        <a:rPr lang="ru-RU" dirty="0" smtClean="0"/>
+                        <a:t>2</a:t>
+                      </a:r>
+                      <a:endParaRPr lang="ru-RU" dirty="0"/>
+                    </a:p>
+                  </a:txBody>
+                  <a:tcPr/>
+                </a:tc>
+                <a:tc>
+                  <a:txBody>
+                    <a:bodyPr/>
+                    <a:lstStyle/>
+                    <a:p>
+                      <a:pPr algn="ctr"/>
+                      <a:r>
+                        <a:rPr lang="ru-RU" dirty="0" smtClean="0"/>
+                        <a:t>1</a:t>
+                      </a:r>
+                      <a:endParaRPr lang="ru-RU" dirty="0"/>
+                    </a:p>
+                  </a:txBody>
+                  <a:tcPr/>
+                </a:tc>
+                <a:tc>
+                  <a:txBody>
+                    <a:bodyPr/>
+                    <a:lstStyle/>
+                    <a:p>
+                      <a:pPr algn="ctr"/>
+                      <a:r>
+                        <a:rPr lang="ru-RU" dirty="0" smtClean="0"/>
+                        <a:t>3</a:t>
+                      </a:r>
+                      <a:endParaRPr lang="ru-RU" dirty="0"/>
+                    </a:p>
+                  </a:txBody>
+                  <a:tcPr/>
+                </a:tc>
+                <a:tc>
+                  <a:txBody>
+                    <a:bodyPr/>
+                    <a:lstStyle/>
+                    <a:p>
+                      <a:pPr algn="ctr"/>
+                      <a:r>
+                        <a:rPr lang="ru-RU" dirty="0" smtClean="0"/>
+                        <a:t>1</a:t>
+                      </a:r>
+                      <a:endParaRPr lang="ru-RU" dirty="0"/>
+                    </a:p>
+                  </a:txBody>
+                  <a:tcPr/>
+                </a:tc>
+                <a:extLst>
+                  <a:ext uri="{0D108BD9-81ED-4DB2-BD59-A6C34878D82A}">
+                    <a16:rowId xmlns:a16="http://schemas.microsoft.com/office/drawing/2014/main" val="570266173"/>
+                  </a:ext>
+                </a:extLst>
+              </a:tr>
+              <a:tr h="405000">
+                <a:tc>
+                  <a:txBody>
+                    <a:bodyPr/>
+                    <a:lstStyle/>
+                    <a:p>
+                      <a:r>
+                        <a:rPr lang="ru-RU" dirty="0" smtClean="0"/>
+                        <a:t>Автоматизация</a:t>
+                      </a:r>
+                      <a:endParaRPr lang="ru-RU" dirty="0"/>
+                    </a:p>
+                  </a:txBody>
+                  <a:tcPr/>
+                </a:tc>
+                <a:tc>
+                  <a:txBody>
+                    <a:bodyPr/>
+                    <a:lstStyle/>
+                    <a:p>
+                      <a:pPr algn="ctr"/>
+                      <a:r>
+                        <a:rPr lang="ru-RU" dirty="0" smtClean="0"/>
+                        <a:t>3</a:t>
+                      </a:r>
+                      <a:endParaRPr lang="ru-RU" dirty="0"/>
+                    </a:p>
+                  </a:txBody>
+                  <a:tcPr/>
+                </a:tc>
+                <a:tc>
+                  <a:txBody>
+                    <a:bodyPr/>
+                    <a:lstStyle/>
+                    <a:p>
+                      <a:pPr algn="ctr"/>
+                      <a:r>
+                        <a:rPr lang="ru-RU" dirty="0" smtClean="0"/>
+                        <a:t>1</a:t>
+                      </a:r>
+                      <a:endParaRPr lang="ru-RU" dirty="0"/>
+                    </a:p>
+                  </a:txBody>
+                  <a:tcPr/>
+                </a:tc>
+                <a:tc>
+                  <a:txBody>
+                    <a:bodyPr/>
+                    <a:lstStyle/>
+                    <a:p>
+                      <a:pPr algn="ctr"/>
+                      <a:r>
+                        <a:rPr lang="ru-RU" dirty="0" smtClean="0"/>
+                        <a:t>3</a:t>
+                      </a:r>
+                      <a:endParaRPr lang="ru-RU" dirty="0"/>
+                    </a:p>
+                  </a:txBody>
+                  <a:tcPr/>
+                </a:tc>
+                <a:tc>
+                  <a:txBody>
+                    <a:bodyPr/>
+                    <a:lstStyle/>
+                    <a:p>
+                      <a:pPr algn="ctr"/>
+                      <a:r>
+                        <a:rPr lang="ru-RU" dirty="0" smtClean="0"/>
+                        <a:t>1</a:t>
+                      </a:r>
+                      <a:endParaRPr lang="ru-RU" dirty="0"/>
+                    </a:p>
+                  </a:txBody>
+                  <a:tcPr/>
+                </a:tc>
+                <a:extLst>
+                  <a:ext uri="{0D108BD9-81ED-4DB2-BD59-A6C34878D82A}">
+                    <a16:rowId xmlns:a16="http://schemas.microsoft.com/office/drawing/2014/main" val="2879431979"/>
+                  </a:ext>
+                </a:extLst>
+              </a:tr>
+              <a:tr h="405000">
+                <a:tc>
+                  <a:txBody>
+                    <a:bodyPr/>
+                    <a:lstStyle/>
+                    <a:p>
+                      <a:r>
+                        <a:rPr lang="ru-RU" dirty="0" smtClean="0"/>
+                        <a:t>Итог</a:t>
+                      </a:r>
+                      <a:endParaRPr lang="ru-RU" dirty="0"/>
+                    </a:p>
+                  </a:txBody>
+                  <a:tcPr/>
+                </a:tc>
+                <a:tc>
+                  <a:txBody>
+                    <a:bodyPr/>
+                    <a:lstStyle/>
+                    <a:p>
+                      <a:pPr algn="ctr"/>
+                      <a:r>
+                        <a:rPr lang="ru-RU" dirty="0" smtClean="0"/>
+                        <a:t>21</a:t>
+                      </a:r>
+                      <a:endParaRPr lang="ru-RU" dirty="0"/>
+                    </a:p>
+                  </a:txBody>
+                  <a:tcPr/>
+                </a:tc>
+                <a:tc>
+                  <a:txBody>
+                    <a:bodyPr/>
+                    <a:lstStyle/>
+                    <a:p>
+                      <a:pPr algn="ctr"/>
+                      <a:r>
+                        <a:rPr lang="ru-RU" dirty="0" smtClean="0"/>
+                        <a:t>19</a:t>
+                      </a:r>
+                      <a:endParaRPr lang="ru-RU" dirty="0"/>
+                    </a:p>
+                  </a:txBody>
+                  <a:tcPr/>
+                </a:tc>
+                <a:tc>
+                  <a:txBody>
+                    <a:bodyPr/>
+                    <a:lstStyle/>
+                    <a:p>
+                      <a:pPr algn="ctr"/>
+                      <a:r>
+                        <a:rPr lang="ru-RU" dirty="0" smtClean="0"/>
+                        <a:t>21</a:t>
+                      </a:r>
+                      <a:endParaRPr lang="ru-RU" dirty="0"/>
+                    </a:p>
+                  </a:txBody>
+                  <a:tcPr/>
+                </a:tc>
+                <a:tc>
+                  <a:txBody>
+                    <a:bodyPr/>
+                    <a:lstStyle/>
+                    <a:p>
+                      <a:pPr algn="ctr"/>
+                      <a:r>
+                        <a:rPr lang="ru-RU" dirty="0" smtClean="0"/>
+                        <a:t>12</a:t>
+                      </a:r>
+                      <a:endParaRPr lang="ru-RU" dirty="0"/>
+                    </a:p>
+                  </a:txBody>
+                  <a:tcPr/>
+                </a:tc>
+                <a:extLst>
+                  <a:ext uri="{0D108BD9-81ED-4DB2-BD59-A6C34878D82A}">
+                    <a16:rowId xmlns:a16="http://schemas.microsoft.com/office/drawing/2014/main" val="987332592"/>
+                  </a:ext>
+                </a:extLst>
+              </a:tr>
+            </a:tbl>
+          </a:graphicData>
+        </a:graphic>
+      </p:graphicFrame>
     </p:spTree>
     <p:extLst>
       <p:ext uri="{BB962C8B-B14F-4D97-AF65-F5344CB8AC3E}">
-        <p14:creationId xmlns:p14="http://schemas.microsoft.com/office/powerpoint/2010/main" val="2207232234"/>
+        <p14:creationId xmlns:p14="http://schemas.microsoft.com/office/powerpoint/2010/main" val="3199080008"/>
       </p:ext>
     </p:extLst>
   </p:cSld>
@@ -5121,6 +6634,99 @@
         <p:spPr>
           <a:xfrm>
             <a:off x="838200" y="365125"/>
+            <a:ext cx="10515600" cy="863311"/>
+          </a:xfrm>
+        </p:spPr>
+        <p:txBody>
+          <a:bodyPr>
+            <a:normAutofit/>
+          </a:bodyPr>
+          <a:lstStyle/>
+          <a:p>
+            <a:pPr algn="ctr"/>
+            <a:r>
+              <a:rPr lang="ru-RU" sz="4000" dirty="0">
+                <a:latin typeface="Times New Roman" panose="02020603050405020304" pitchFamily="18" charset="0"/>
+                <a:cs typeface="Times New Roman" panose="02020603050405020304" pitchFamily="18" charset="0"/>
+              </a:rPr>
+              <a:t>Разработать готовую </a:t>
+            </a:r>
+            <a:r>
+              <a:rPr lang="ru-RU" sz="4000" dirty="0" smtClean="0">
+                <a:latin typeface="Times New Roman" panose="02020603050405020304" pitchFamily="18" charset="0"/>
+                <a:cs typeface="Times New Roman" panose="02020603050405020304" pitchFamily="18" charset="0"/>
+              </a:rPr>
+              <a:t>ИС работы СТО</a:t>
+            </a:r>
+            <a:endParaRPr lang="ru-RU" sz="4000" dirty="0">
+              <a:latin typeface="Times New Roman" panose="02020603050405020304" pitchFamily="18" charset="0"/>
+              <a:cs typeface="Times New Roman" panose="02020603050405020304" pitchFamily="18" charset="0"/>
+            </a:endParaRPr>
+          </a:p>
+        </p:txBody>
+      </p:sp>
+    </p:spTree>
+    <p:extLst>
+      <p:ext uri="{BB962C8B-B14F-4D97-AF65-F5344CB8AC3E}">
+        <p14:creationId xmlns:p14="http://schemas.microsoft.com/office/powerpoint/2010/main" val="2207232234"/>
+      </p:ext>
+    </p:extLst>
+  </p:cSld>
+  <p:clrMapOvr>
+    <a:overrideClrMapping bg1="lt1" tx1="dk1" bg2="lt2" tx2="dk2" accent1="accent1" accent2="accent2" accent3="accent3" accent4="accent4" accent5="accent5" accent6="accent6" hlink="hlink" folHlink="folHlink"/>
+  </p:clrMapOvr>
+  <p:timing>
+    <p:tnLst>
+      <p:par>
+        <p:cTn id="1" dur="indefinite" restart="never" nodeType="tmRoot"/>
+      </p:par>
+    </p:tnLst>
+  </p:timing>
+</p:sld>
+</file>
+
+<file path=ppt/slides/slide8.xml><?xml version="1.0" encoding="utf-8"?>
+<p:sld xmlns:a="http://schemas.openxmlformats.org/drawingml/2006/main" xmlns:r="http://schemas.openxmlformats.org/officeDocument/2006/relationships" xmlns:p="http://schemas.openxmlformats.org/presentationml/2006/main">
+  <p:cSld>
+    <p:bg>
+      <p:bgPr>
+        <a:solidFill>
+          <a:schemeClr val="accent1">
+            <a:lumMod val="40000"/>
+            <a:lumOff val="60000"/>
+            <a:alpha val="31000"/>
+          </a:schemeClr>
+        </a:solidFill>
+        <a:effectLst/>
+      </p:bgPr>
+    </p:bg>
+    <p:spTree>
+      <p:nvGrpSpPr>
+        <p:cNvPr id="1" name=""/>
+        <p:cNvGrpSpPr/>
+        <p:nvPr/>
+      </p:nvGrpSpPr>
+      <p:grpSpPr>
+        <a:xfrm>
+          <a:off x="0" y="0"/>
+          <a:ext cx="0" cy="0"/>
+          <a:chOff x="0" y="0"/>
+          <a:chExt cx="0" cy="0"/>
+        </a:xfrm>
+      </p:grpSpPr>
+      <p:sp>
+        <p:nvSpPr>
+          <p:cNvPr id="2" name="Заголовок 1"/>
+          <p:cNvSpPr>
+            <a:spLocks noGrp="1"/>
+          </p:cNvSpPr>
+          <p:nvPr>
+            <p:ph type="title"/>
+          </p:nvPr>
+        </p:nvSpPr>
+        <p:spPr>
+          <a:xfrm>
+            <a:off x="838200" y="365125"/>
             <a:ext cx="10515600" cy="743239"/>
           </a:xfrm>
         </p:spPr>
@@ -5175,14 +6781,7 @@
                 <a:latin typeface="Times New Roman" panose="02020603050405020304" pitchFamily="18" charset="0"/>
                 <a:cs typeface="Times New Roman" panose="02020603050405020304" pitchFamily="18" charset="0"/>
               </a:rPr>
-              <a:t>	Цель работы была достигнута. Была создана ИС с помощью которой, можно автоматизировать работу СТО. </a:t>
-            </a:r>
-            <a:r>
-              <a:rPr lang="ru-RU" dirty="0" smtClean="0">
-                <a:latin typeface="Times New Roman" panose="02020603050405020304" pitchFamily="18" charset="0"/>
-                <a:cs typeface="Times New Roman" panose="02020603050405020304" pitchFamily="18" charset="0"/>
-              </a:rPr>
-              <a:t>В ходе выполнения поставленной цели все поставленные задачи так же были достигнуты. </a:t>
+              <a:t>	Цель работы была достигнута. Была создана ИС с помощью которой, можно автоматизировать работу СТО. В ходе выполнения поставленной цели все поставленные задачи так же были достигнуты. </a:t>
             </a:r>
           </a:p>
           <a:p>
@@ -5230,7 +6829,7 @@
 </p:sld>
 </file>
 
-<file path=ppt/slides/slide8.xml><?xml version="1.0" encoding="utf-8"?>
+<file path=ppt/slides/slide9.xml><?xml version="1.0" encoding="utf-8"?>
 <p:sld xmlns:a="http://schemas.openxmlformats.org/drawingml/2006/main" xmlns:r="http://schemas.openxmlformats.org/officeDocument/2006/relationships" xmlns:p="http://schemas.openxmlformats.org/presentationml/2006/main">
   <p:cSld>
     <p:bg>
@@ -6137,4 +7736,47 @@
     </a:folHlink>
   </a:clrScheme>
 </a:themeOverride>
+</file>
+
+<file path=ppt/theme/themeOverride8.xml><?xml version="1.0" encoding="utf-8"?>
+<a:themeOverride xmlns:a="http://schemas.openxmlformats.org/drawingml/2006/main">
+  <a:clrScheme name="Стандартная">
+    <a:dk1>
+      <a:sysClr val="windowText" lastClr="000000"/>
+    </a:dk1>
+    <a:lt1>
+      <a:sysClr val="window" lastClr="FFFFFF"/>
+    </a:lt1>
+    <a:dk2>
+      <a:srgbClr val="44546A"/>
+    </a:dk2>
+    <a:lt2>
+      <a:srgbClr val="E7E6E6"/>
+    </a:lt2>
+    <a:accent1>
+      <a:srgbClr val="5B9BD5"/>
+    </a:accent1>
+    <a:accent2>
+      <a:srgbClr val="ED7D31"/>
+    </a:accent2>
+    <a:accent3>
+      <a:srgbClr val="A5A5A5"/>
+    </a:accent3>
+    <a:accent4>
+      <a:srgbClr val="FFC000"/>
+    </a:accent4>
+    <a:accent5>
+      <a:srgbClr val="4472C4"/>
+    </a:accent5>
+    <a:accent6>
+      <a:srgbClr val="70AD47"/>
+    </a:accent6>
+    <a:hlink>
+      <a:srgbClr val="0563C1"/>
+    </a:hlink>
+    <a:folHlink>
+      <a:srgbClr val="954F72"/>
+    </a:folHlink>
+  </a:clrScheme>
+</a:themeOverride>
 </file>
</xml_diff>